<commit_message>
Ajuste ppt aulas arq comput 11/03/2024
</commit_message>
<xml_diff>
--- a/01 Classes/Aula2 - Arquitetura - Organização do Computador.pptx
+++ b/01 Classes/Aula2 - Arquitetura - Organização do Computador.pptx
@@ -302,7 +302,7 @@
       </p15:sldGuideLst>
     </p:ext>
     <p:ext uri="http://customooxmlschemas.google.com/">
-      <go:slidesCustomData xmlns:go="http://customooxmlschemas.google.com/" xmlns:ahyp="http://schemas.microsoft.com/office/drawing/2018/hyperlinkcolor" xmlns:p15="http://schemas.microsoft.com/office/powerpoint/2012/main" xmlns:p14="http://schemas.microsoft.com/office/powerpoint/2010/main" xmlns:com="http://schemas.openxmlformats.org/drawingml/2006/compatibility" xmlns:pvml="urn:schemas-microsoft-com:office:powerpoint" xmlns:v="urn:schemas-microsoft-com:vml" xmlns:o="urn:schemas-microsoft-com:office:office" xmlns:dgm="http://schemas.openxmlformats.org/drawingml/2006/diagram" xmlns:c="http://schemas.openxmlformats.org/drawingml/2006/chart" xmlns:mv="urn:schemas-microsoft-com:mac:vml" xmlns:mc="http://schemas.openxmlformats.org/markup-compatibility/2006" xmlns="" r:id="rId53" roundtripDataSignature="AMtx7mgJ3DVbJs5R7vdpQPdhVUs/+di+zg=="/>
+      <go:slidesCustomData xmlns="" xmlns:mc="http://schemas.openxmlformats.org/markup-compatibility/2006" xmlns:mv="urn:schemas-microsoft-com:mac:vml" xmlns:c="http://schemas.openxmlformats.org/drawingml/2006/chart" xmlns:dgm="http://schemas.openxmlformats.org/drawingml/2006/diagram" xmlns:o="urn:schemas-microsoft-com:office:office" xmlns:v="urn:schemas-microsoft-com:vml" xmlns:pvml="urn:schemas-microsoft-com:office:powerpoint" xmlns:com="http://schemas.openxmlformats.org/drawingml/2006/compatibility" xmlns:p14="http://schemas.microsoft.com/office/powerpoint/2010/main" xmlns:p15="http://schemas.microsoft.com/office/powerpoint/2012/main" xmlns:ahyp="http://schemas.microsoft.com/office/drawing/2018/hyperlinkcolor" xmlns:go="http://customooxmlschemas.google.com/" r:id="rId53" roundtripDataSignature="AMtx7mgJ3DVbJs5R7vdpQPdhVUs/+di+zg=="/>
     </p:ext>
   </p:extLst>
 </p:presentation>
@@ -20914,6 +20914,56 @@
           </a:ln>
         </p:spPr>
       </p:pic>
+      <p:sp>
+        <p:nvSpPr>
+          <p:cNvPr id="2" name="CaixaDeTexto 1">
+            <a:extLst>
+              <a:ext uri="{FF2B5EF4-FFF2-40B4-BE49-F238E27FC236}">
+                <a16:creationId xmlns:a16="http://schemas.microsoft.com/office/drawing/2014/main" id="{EF0180D9-F4EB-B633-62D8-126FFAE9A77E}"/>
+              </a:ext>
+            </a:extLst>
+          </p:cNvPr>
+          <p:cNvSpPr txBox="1"/>
+          <p:nvPr/>
+        </p:nvSpPr>
+        <p:spPr>
+          <a:xfrm>
+            <a:off x="302841" y="5890827"/>
+            <a:ext cx="8229599" cy="307777"/>
+          </a:xfrm>
+          <a:prstGeom prst="rect">
+            <a:avLst/>
+          </a:prstGeom>
+          <a:noFill/>
+        </p:spPr>
+        <p:txBody>
+          <a:bodyPr wrap="square">
+            <a:spAutoFit/>
+          </a:bodyPr>
+          <a:lstStyle/>
+          <a:p>
+            <a:r>
+              <a:rPr lang="pt-BR" sz="1400" b="1" dirty="0"/>
+              <a:t>HD </a:t>
+            </a:r>
+            <a:r>
+              <a:rPr lang="pt-BR" sz="1400" b="1" dirty="0" err="1"/>
+              <a:t>vs</a:t>
+            </a:r>
+            <a:r>
+              <a:rPr lang="pt-BR" sz="1400" b="1" dirty="0"/>
+              <a:t> SSD </a:t>
+            </a:r>
+            <a:r>
+              <a:rPr lang="pt-BR" sz="1400" dirty="0">
+                <a:hlinkClick r:id="rId6"/>
+              </a:rPr>
+              <a:t>https://flechatec.net.br/15-drivers-ssds-nao-sao-mais-uma-tendencia-vieram-para-ficar/</a:t>
+            </a:r>
+            <a:endParaRPr lang="pt-BR" dirty="0"/>
+          </a:p>
+        </p:txBody>
+      </p:sp>
     </p:spTree>
   </p:cSld>
   <p:clrMapOvr>
@@ -24682,7 +24732,7 @@
         </p:spPr>
         <p:txBody>
           <a:bodyPr spcFirstLastPara="1" wrap="square" lIns="91425" tIns="45700" rIns="91425" bIns="45700" anchor="t" anchorCtr="0">
-            <a:normAutofit/>
+            <a:normAutofit lnSpcReduction="10000"/>
           </a:bodyPr>
           <a:lstStyle/>
           <a:p>
@@ -26149,7 +26199,7 @@
         </p:spPr>
         <p:txBody>
           <a:bodyPr spcFirstLastPara="1" wrap="square" lIns="91425" tIns="45700" rIns="91425" bIns="45700" anchor="t" anchorCtr="0">
-            <a:normAutofit/>
+            <a:normAutofit lnSpcReduction="10000"/>
           </a:bodyPr>
           <a:lstStyle/>
           <a:p>
@@ -33727,7 +33777,7 @@
         </p:spPr>
         <p:txBody>
           <a:bodyPr spcFirstLastPara="1" wrap="square" lIns="91425" tIns="45700" rIns="91425" bIns="45700" anchor="t" anchorCtr="0">
-            <a:normAutofit/>
+            <a:normAutofit lnSpcReduction="10000"/>
           </a:bodyPr>
           <a:lstStyle/>
           <a:p>
@@ -35826,7 +35876,7 @@
         </p:nvGraphicFramePr>
         <p:xfrm>
           <a:off x="642910" y="1785926"/>
-          <a:ext cx="3000000" cy="3000000"/>
+          <a:ext cx="8001050" cy="3708500"/>
         </p:xfrm>
         <a:graphic>
           <a:graphicData uri="http://schemas.openxmlformats.org/drawingml/2006/table">
@@ -39416,7 +39466,7 @@
         </p:spPr>
         <p:txBody>
           <a:bodyPr spcFirstLastPara="1" wrap="square" lIns="91425" tIns="45700" rIns="91425" bIns="45700" anchor="t" anchorCtr="0">
-            <a:normAutofit/>
+            <a:normAutofit lnSpcReduction="10000"/>
           </a:bodyPr>
           <a:lstStyle/>
           <a:p>
@@ -45283,7 +45333,7 @@
         </p:spPr>
         <p:txBody>
           <a:bodyPr spcFirstLastPara="1" wrap="square" lIns="91425" tIns="45700" rIns="91425" bIns="45700" anchor="t" anchorCtr="0">
-            <a:normAutofit/>
+            <a:normAutofit fontScale="92500" lnSpcReduction="10000"/>
           </a:bodyPr>
           <a:lstStyle/>
           <a:p>
@@ -51103,7 +51153,7 @@
         </p:spPr>
         <p:txBody>
           <a:bodyPr spcFirstLastPara="1" wrap="square" lIns="91425" tIns="45700" rIns="91425" bIns="45700" anchor="t" anchorCtr="0">
-            <a:normAutofit/>
+            <a:normAutofit lnSpcReduction="10000"/>
           </a:bodyPr>
           <a:lstStyle/>
           <a:p>
@@ -54684,7 +54734,7 @@
         </p:spPr>
         <p:txBody>
           <a:bodyPr spcFirstLastPara="1" wrap="square" lIns="91425" tIns="45700" rIns="91425" bIns="45700" anchor="t" anchorCtr="0">
-            <a:normAutofit/>
+            <a:normAutofit fontScale="92500" lnSpcReduction="10000"/>
           </a:bodyPr>
           <a:lstStyle/>
           <a:p>

</xml_diff>